<commit_message>
fix padding call + screenshots
</commit_message>
<xml_diff>
--- a/presentation/KernelImageProcessing.pptx
+++ b/presentation/KernelImageProcessing.pptx
@@ -257,7 +257,7 @@
             <a:fld id="{45BF3CCC-77DD-F84F-A249-CA3C5045A043}" type="datetime1">
               <a:rPr lang="it-IT" smtClean="0"/>
               <a:pPr/>
-              <a:t>22/01/2023</a:t>
+              <a:t>28/01/2023</a:t>
             </a:fld>
             <a:endParaRPr lang="it-IT"/>
           </a:p>
@@ -425,7 +425,7 @@
             <a:fld id="{FE692227-D6DC-FD45-9507-DB2BAD58473C}" type="datetime1">
               <a:rPr lang="it-IT" smtClean="0"/>
               <a:pPr/>
-              <a:t>22/01/2023</a:t>
+              <a:t>28/01/2023</a:t>
             </a:fld>
             <a:endParaRPr lang="it-IT"/>
           </a:p>
@@ -2234,7 +2234,7 @@
             <a:fld id="{AD8BF249-6BAC-CD40-AAE9-334F110649E5}" type="datetimeFigureOut">
               <a:rPr lang="it-IT" smtClean="0"/>
               <a:pPr/>
-              <a:t>22/01/2023</a:t>
+              <a:t>28/01/2023</a:t>
             </a:fld>
             <a:endParaRPr lang="it-IT"/>
           </a:p>
@@ -2404,7 +2404,7 @@
             <a:fld id="{AD8BF249-6BAC-CD40-AAE9-334F110649E5}" type="datetimeFigureOut">
               <a:rPr lang="it-IT" smtClean="0"/>
               <a:pPr/>
-              <a:t>22/01/2023</a:t>
+              <a:t>28/01/2023</a:t>
             </a:fld>
             <a:endParaRPr lang="it-IT"/>
           </a:p>
@@ -2584,7 +2584,7 @@
             <a:fld id="{AD8BF249-6BAC-CD40-AAE9-334F110649E5}" type="datetimeFigureOut">
               <a:rPr lang="it-IT" smtClean="0"/>
               <a:pPr/>
-              <a:t>22/01/2023</a:t>
+              <a:t>28/01/2023</a:t>
             </a:fld>
             <a:endParaRPr lang="it-IT"/>
           </a:p>
@@ -2754,7 +2754,7 @@
             <a:fld id="{AD8BF249-6BAC-CD40-AAE9-334F110649E5}" type="datetimeFigureOut">
               <a:rPr lang="it-IT" smtClean="0"/>
               <a:pPr/>
-              <a:t>22/01/2023</a:t>
+              <a:t>28/01/2023</a:t>
             </a:fld>
             <a:endParaRPr lang="it-IT"/>
           </a:p>
@@ -3001,7 +3001,7 @@
             <a:fld id="{AD8BF249-6BAC-CD40-AAE9-334F110649E5}" type="datetimeFigureOut">
               <a:rPr lang="it-IT" smtClean="0"/>
               <a:pPr/>
-              <a:t>22/01/2023</a:t>
+              <a:t>28/01/2023</a:t>
             </a:fld>
             <a:endParaRPr lang="it-IT"/>
           </a:p>
@@ -3288,7 +3288,7 @@
             <a:fld id="{AD8BF249-6BAC-CD40-AAE9-334F110649E5}" type="datetimeFigureOut">
               <a:rPr lang="it-IT" smtClean="0"/>
               <a:pPr/>
-              <a:t>22/01/2023</a:t>
+              <a:t>28/01/2023</a:t>
             </a:fld>
             <a:endParaRPr lang="it-IT"/>
           </a:p>
@@ -3709,7 +3709,7 @@
             <a:fld id="{AD8BF249-6BAC-CD40-AAE9-334F110649E5}" type="datetimeFigureOut">
               <a:rPr lang="it-IT" smtClean="0"/>
               <a:pPr/>
-              <a:t>22/01/2023</a:t>
+              <a:t>28/01/2023</a:t>
             </a:fld>
             <a:endParaRPr lang="it-IT"/>
           </a:p>
@@ -3828,7 +3828,7 @@
             <a:fld id="{AD8BF249-6BAC-CD40-AAE9-334F110649E5}" type="datetimeFigureOut">
               <a:rPr lang="it-IT" smtClean="0"/>
               <a:pPr/>
-              <a:t>22/01/2023</a:t>
+              <a:t>28/01/2023</a:t>
             </a:fld>
             <a:endParaRPr lang="it-IT"/>
           </a:p>
@@ -3925,7 +3925,7 @@
             <a:fld id="{AD8BF249-6BAC-CD40-AAE9-334F110649E5}" type="datetimeFigureOut">
               <a:rPr lang="it-IT" smtClean="0"/>
               <a:pPr/>
-              <a:t>22/01/2023</a:t>
+              <a:t>28/01/2023</a:t>
             </a:fld>
             <a:endParaRPr lang="it-IT"/>
           </a:p>
@@ -4202,7 +4202,7 @@
             <a:fld id="{AD8BF249-6BAC-CD40-AAE9-334F110649E5}" type="datetimeFigureOut">
               <a:rPr lang="it-IT" smtClean="0"/>
               <a:pPr/>
-              <a:t>22/01/2023</a:t>
+              <a:t>28/01/2023</a:t>
             </a:fld>
             <a:endParaRPr lang="it-IT"/>
           </a:p>
@@ -4456,7 +4456,7 @@
             <a:fld id="{AD8BF249-6BAC-CD40-AAE9-334F110649E5}" type="datetimeFigureOut">
               <a:rPr lang="it-IT" smtClean="0"/>
               <a:pPr/>
-              <a:t>22/01/2023</a:t>
+              <a:t>28/01/2023</a:t>
             </a:fld>
             <a:endParaRPr lang="it-IT"/>
           </a:p>
@@ -4669,7 +4669,7 @@
             <a:fld id="{AD8BF249-6BAC-CD40-AAE9-334F110649E5}" type="datetimeFigureOut">
               <a:rPr lang="it-IT" smtClean="0"/>
               <a:pPr/>
-              <a:t>22/01/2023</a:t>
+              <a:t>28/01/2023</a:t>
             </a:fld>
             <a:endParaRPr lang="it-IT"/>
           </a:p>
@@ -6260,10 +6260,10 @@
       </p:sp>
       <p:pic>
         <p:nvPicPr>
-          <p:cNvPr id="5" name="Immagine 4" descr="Immagine che contiene testo&#10;&#10;Descrizione generata automaticamente">
+          <p:cNvPr id="4" name="Immagine 3" descr="Immagine che contiene testo&#10;&#10;Descrizione generata automaticamente">
             <a:extLst>
               <a:ext uri="{FF2B5EF4-FFF2-40B4-BE49-F238E27FC236}">
-                <a16:creationId xmlns:a16="http://schemas.microsoft.com/office/drawing/2014/main" id="{9E2BC4B6-9281-0C7E-09EB-F98C9C3249C9}"/>
+                <a16:creationId xmlns:a16="http://schemas.microsoft.com/office/drawing/2014/main" id="{261A050D-34C2-B374-8FC6-29AA9A2B85D7}"/>
               </a:ext>
             </a:extLst>
           </p:cNvPr>
@@ -6280,8 +6280,8 @@
         </p:blipFill>
         <p:spPr>
           <a:xfrm>
-            <a:off x="587170" y="2166778"/>
-            <a:ext cx="7969660" cy="4038808"/>
+            <a:off x="606221" y="2166661"/>
+            <a:ext cx="7931558" cy="4000706"/>
           </a:xfrm>
           <a:prstGeom prst="rect">
             <a:avLst/>
@@ -11851,10 +11851,10 @@
       </p:sp>
       <p:pic>
         <p:nvPicPr>
-          <p:cNvPr id="15" name="Immagine 14" descr="Immagine che contiene testo&#10;&#10;Descrizione generata automaticamente">
+          <p:cNvPr id="4" name="Immagine 3" descr="Immagine che contiene testo&#10;&#10;Descrizione generata automaticamente">
             <a:extLst>
               <a:ext uri="{FF2B5EF4-FFF2-40B4-BE49-F238E27FC236}">
-                <a16:creationId xmlns:a16="http://schemas.microsoft.com/office/drawing/2014/main" id="{5BDE29D6-B89B-E10F-F9E8-1035E9CA05C2}"/>
+                <a16:creationId xmlns:a16="http://schemas.microsoft.com/office/drawing/2014/main" id="{5A5F8E58-20B9-F6A3-2740-C01BAA99BC37}"/>
               </a:ext>
             </a:extLst>
           </p:cNvPr>
@@ -11871,8 +11871,8 @@
         </p:blipFill>
         <p:spPr>
           <a:xfrm>
-            <a:off x="1743831" y="2287211"/>
-            <a:ext cx="5560484" cy="4079255"/>
+            <a:off x="1024547" y="2199620"/>
+            <a:ext cx="7131417" cy="4426177"/>
           </a:xfrm>
           <a:prstGeom prst="rect">
             <a:avLst/>
@@ -12281,10 +12281,10 @@
       </p:sp>
       <p:pic>
         <p:nvPicPr>
-          <p:cNvPr id="6" name="Immagine 5" descr="Immagine che contiene testo&#10;&#10;Descrizione generata automaticamente">
+          <p:cNvPr id="4" name="Immagine 3" descr="Immagine che contiene testo&#10;&#10;Descrizione generata automaticamente">
             <a:extLst>
               <a:ext uri="{FF2B5EF4-FFF2-40B4-BE49-F238E27FC236}">
-                <a16:creationId xmlns:a16="http://schemas.microsoft.com/office/drawing/2014/main" id="{C4136547-1BFD-E85F-0A56-5CDEAE126137}"/>
+                <a16:creationId xmlns:a16="http://schemas.microsoft.com/office/drawing/2014/main" id="{CCBDD0E7-7B52-5760-A888-0DF55D99DB20}"/>
               </a:ext>
             </a:extLst>
           </p:cNvPr>
@@ -12301,8 +12301,8 @@
         </p:blipFill>
         <p:spPr>
           <a:xfrm>
-            <a:off x="557799" y="2671512"/>
-            <a:ext cx="8064914" cy="2991004"/>
+            <a:off x="567324" y="2708361"/>
+            <a:ext cx="8045863" cy="2724290"/>
           </a:xfrm>
           <a:prstGeom prst="rect">
             <a:avLst/>

</xml_diff>